<commit_message>
Added test case for issue we just fixed
</commit_message>
<xml_diff>
--- a/spec/test_cases/Faces.pptx
+++ b/spec/test_cases/Faces.pptx
@@ -5,13 +5,14 @@
     <p:sldMasterId id="2147483648" r:id="rId1"/>
   </p:sldMasterIdLst>
   <p:notesMasterIdLst>
-    <p:notesMasterId r:id="rId6"/>
+    <p:notesMasterId r:id="rId7"/>
   </p:notesMasterIdLst>
   <p:sldIdLst>
     <p:sldId id="257" r:id="rId2"/>
     <p:sldId id="256" r:id="rId3"/>
     <p:sldId id="258" r:id="rId4"/>
     <p:sldId id="259" r:id="rId5"/>
+    <p:sldId id="260" r:id="rId6"/>
   </p:sldIdLst>
   <p:sldSz cx="12192000" cy="6858000"/>
   <p:notesSz cx="6858000" cy="9144000"/>
@@ -626,6 +627,90 @@
     <p:extLst>
       <p:ext uri="{BB962C8B-B14F-4D97-AF65-F5344CB8AC3E}">
         <p14:creationId xmlns:p14="http://schemas.microsoft.com/office/powerpoint/2010/main" val="3250000593"/>
+      </p:ext>
+    </p:extLst>
+  </p:cSld>
+  <p:clrMapOvr>
+    <a:masterClrMapping/>
+  </p:clrMapOvr>
+</p:notes>
+</file>
+
+<file path=ppt/notesSlides/notesSlide3.xml><?xml version="1.0" encoding="utf-8"?>
+<p:notes xmlns:a="http://schemas.openxmlformats.org/drawingml/2006/main" xmlns:r="http://schemas.openxmlformats.org/officeDocument/2006/relationships" xmlns:p="http://schemas.openxmlformats.org/presentationml/2006/main">
+  <p:cSld>
+    <p:spTree>
+      <p:nvGrpSpPr>
+        <p:cNvPr id="1" name=""/>
+        <p:cNvGrpSpPr/>
+        <p:nvPr/>
+      </p:nvGrpSpPr>
+      <p:grpSpPr>
+        <a:xfrm>
+          <a:off x="0" y="0"/>
+          <a:ext cx="0" cy="0"/>
+          <a:chOff x="0" y="0"/>
+          <a:chExt cx="0" cy="0"/>
+        </a:xfrm>
+      </p:grpSpPr>
+      <p:sp>
+        <p:nvSpPr>
+          <p:cNvPr id="2" name="Slide Image Placeholder 1"/>
+          <p:cNvSpPr>
+            <a:spLocks noGrp="1" noRot="1" noChangeAspect="1"/>
+          </p:cNvSpPr>
+          <p:nvPr>
+            <p:ph type="sldImg"/>
+          </p:nvPr>
+        </p:nvSpPr>
+        <p:spPr/>
+      </p:sp>
+      <p:sp>
+        <p:nvSpPr>
+          <p:cNvPr id="3" name="Notes Placeholder 2"/>
+          <p:cNvSpPr>
+            <a:spLocks noGrp="1"/>
+          </p:cNvSpPr>
+          <p:nvPr>
+            <p:ph type="body" idx="1"/>
+          </p:nvPr>
+        </p:nvSpPr>
+        <p:spPr/>
+        <p:txBody>
+          <a:bodyPr/>
+          <a:lstStyle/>
+          <a:p>
+            <a:endParaRPr lang="en-US" dirty="0"/>
+          </a:p>
+        </p:txBody>
+      </p:sp>
+      <p:sp>
+        <p:nvSpPr>
+          <p:cNvPr id="4" name="Slide Number Placeholder 3"/>
+          <p:cNvSpPr>
+            <a:spLocks noGrp="1"/>
+          </p:cNvSpPr>
+          <p:nvPr>
+            <p:ph type="sldNum" sz="quarter" idx="5"/>
+          </p:nvPr>
+        </p:nvSpPr>
+        <p:spPr/>
+        <p:txBody>
+          <a:bodyPr/>
+          <a:lstStyle/>
+          <a:p>
+            <a:fld id="{5346D917-A858-4F04-9184-B05A81C373D6}" type="slidenum">
+              <a:rPr lang="en-US" smtClean="0"/>
+              <a:t>5</a:t>
+            </a:fld>
+            <a:endParaRPr lang="en-US"/>
+          </a:p>
+        </p:txBody>
+      </p:sp>
+    </p:spTree>
+    <p:extLst>
+      <p:ext uri="{BB962C8B-B14F-4D97-AF65-F5344CB8AC3E}">
+        <p14:creationId xmlns:p14="http://schemas.microsoft.com/office/powerpoint/2010/main" val="3731450670"/>
       </p:ext>
     </p:extLst>
   </p:cSld>
@@ -7671,7 +7756,7 @@
           <a:p>
             <a:r>
               <a:rPr lang="en-US" dirty="0"/>
-              <a:t>Case 3</a:t>
+              <a:t>Case 4</a:t>
             </a:r>
           </a:p>
         </p:txBody>
@@ -8604,6 +8689,1793 @@
     <p:extLst>
       <p:ext uri="{BB962C8B-B14F-4D97-AF65-F5344CB8AC3E}">
         <p14:creationId xmlns:p14="http://schemas.microsoft.com/office/powerpoint/2010/main" val="1225567711"/>
+      </p:ext>
+    </p:extLst>
+  </p:cSld>
+  <p:clrMapOvr>
+    <a:masterClrMapping/>
+  </p:clrMapOvr>
+</p:sld>
+</file>
+
+<file path=ppt/slides/slide5.xml><?xml version="1.0" encoding="utf-8"?>
+<p:sld xmlns:a="http://schemas.openxmlformats.org/drawingml/2006/main" xmlns:r="http://schemas.openxmlformats.org/officeDocument/2006/relationships" xmlns:p="http://schemas.openxmlformats.org/presentationml/2006/main">
+  <p:cSld>
+    <p:spTree>
+      <p:nvGrpSpPr>
+        <p:cNvPr id="1" name=""/>
+        <p:cNvGrpSpPr/>
+        <p:nvPr/>
+      </p:nvGrpSpPr>
+      <p:grpSpPr>
+        <a:xfrm>
+          <a:off x="0" y="0"/>
+          <a:ext cx="0" cy="0"/>
+          <a:chOff x="0" y="0"/>
+          <a:chExt cx="0" cy="0"/>
+        </a:xfrm>
+      </p:grpSpPr>
+      <p:cxnSp>
+        <p:nvCxnSpPr>
+          <p:cNvPr id="26" name="Straight Connector 25">
+            <a:extLst>
+              <a:ext uri="{FF2B5EF4-FFF2-40B4-BE49-F238E27FC236}">
+                <a16:creationId xmlns:a16="http://schemas.microsoft.com/office/drawing/2014/main" id="{960B299D-2FA2-4C5B-8640-99A10851D229}"/>
+              </a:ext>
+            </a:extLst>
+          </p:cNvPr>
+          <p:cNvCxnSpPr/>
+          <p:nvPr/>
+        </p:nvCxnSpPr>
+        <p:spPr>
+          <a:xfrm>
+            <a:off x="9268701" y="2529587"/>
+            <a:ext cx="0" cy="3747541"/>
+          </a:xfrm>
+          <a:prstGeom prst="line">
+            <a:avLst/>
+          </a:prstGeom>
+        </p:spPr>
+        <p:style>
+          <a:lnRef idx="1">
+            <a:schemeClr val="accent1"/>
+          </a:lnRef>
+          <a:fillRef idx="0">
+            <a:schemeClr val="accent1"/>
+          </a:fillRef>
+          <a:effectRef idx="0">
+            <a:schemeClr val="accent1"/>
+          </a:effectRef>
+          <a:fontRef idx="minor">
+            <a:schemeClr val="tx1"/>
+          </a:fontRef>
+        </p:style>
+      </p:cxnSp>
+      <p:cxnSp>
+        <p:nvCxnSpPr>
+          <p:cNvPr id="25" name="Straight Connector 24">
+            <a:extLst>
+              <a:ext uri="{FF2B5EF4-FFF2-40B4-BE49-F238E27FC236}">
+                <a16:creationId xmlns:a16="http://schemas.microsoft.com/office/drawing/2014/main" id="{ADB7DDB5-9781-4F38-A9EE-C945F1FD62C6}"/>
+              </a:ext>
+            </a:extLst>
+          </p:cNvPr>
+          <p:cNvCxnSpPr/>
+          <p:nvPr/>
+        </p:nvCxnSpPr>
+        <p:spPr>
+          <a:xfrm>
+            <a:off x="7574813" y="1360355"/>
+            <a:ext cx="0" cy="3747541"/>
+          </a:xfrm>
+          <a:prstGeom prst="line">
+            <a:avLst/>
+          </a:prstGeom>
+        </p:spPr>
+        <p:style>
+          <a:lnRef idx="1">
+            <a:schemeClr val="accent1"/>
+          </a:lnRef>
+          <a:fillRef idx="0">
+            <a:schemeClr val="accent1"/>
+          </a:fillRef>
+          <a:effectRef idx="0">
+            <a:schemeClr val="accent1"/>
+          </a:effectRef>
+          <a:fontRef idx="minor">
+            <a:schemeClr val="tx1"/>
+          </a:fontRef>
+        </p:style>
+      </p:cxnSp>
+      <p:sp>
+        <p:nvSpPr>
+          <p:cNvPr id="5" name="Freeform: Shape 4">
+            <a:extLst>
+              <a:ext uri="{FF2B5EF4-FFF2-40B4-BE49-F238E27FC236}">
+                <a16:creationId xmlns:a16="http://schemas.microsoft.com/office/drawing/2014/main" id="{76E7C98F-658A-4F54-8107-E7DE1D3F63DD}"/>
+              </a:ext>
+            </a:extLst>
+          </p:cNvPr>
+          <p:cNvSpPr/>
+          <p:nvPr/>
+        </p:nvSpPr>
+        <p:spPr>
+          <a:xfrm>
+            <a:off x="6700257" y="1729604"/>
+            <a:ext cx="3462728" cy="3972393"/>
+          </a:xfrm>
+          <a:custGeom>
+            <a:avLst/>
+            <a:gdLst>
+              <a:gd name="connsiteX0" fmla="*/ 14990 w 3462728"/>
+              <a:gd name="connsiteY0" fmla="*/ 0 h 3972393"/>
+              <a:gd name="connsiteX1" fmla="*/ 0 w 3462728"/>
+              <a:gd name="connsiteY1" fmla="*/ 1244183 h 3972393"/>
+              <a:gd name="connsiteX2" fmla="*/ 3432747 w 3462728"/>
+              <a:gd name="connsiteY2" fmla="*/ 3972393 h 3972393"/>
+              <a:gd name="connsiteX3" fmla="*/ 3462728 w 3462728"/>
+              <a:gd name="connsiteY3" fmla="*/ 2758190 h 3972393"/>
+              <a:gd name="connsiteX4" fmla="*/ 14990 w 3462728"/>
+              <a:gd name="connsiteY4" fmla="*/ 0 h 3972393"/>
+            </a:gdLst>
+            <a:ahLst/>
+            <a:cxnLst>
+              <a:cxn ang="0">
+                <a:pos x="connsiteX0" y="connsiteY0"/>
+              </a:cxn>
+              <a:cxn ang="0">
+                <a:pos x="connsiteX1" y="connsiteY1"/>
+              </a:cxn>
+              <a:cxn ang="0">
+                <a:pos x="connsiteX2" y="connsiteY2"/>
+              </a:cxn>
+              <a:cxn ang="0">
+                <a:pos x="connsiteX3" y="connsiteY3"/>
+              </a:cxn>
+              <a:cxn ang="0">
+                <a:pos x="connsiteX4" y="connsiteY4"/>
+              </a:cxn>
+            </a:cxnLst>
+            <a:rect l="l" t="t" r="r" b="b"/>
+            <a:pathLst>
+              <a:path w="3462728" h="3972393">
+                <a:moveTo>
+                  <a:pt x="14990" y="0"/>
+                </a:moveTo>
+                <a:lnTo>
+                  <a:pt x="0" y="1244183"/>
+                </a:lnTo>
+                <a:lnTo>
+                  <a:pt x="3432747" y="3972393"/>
+                </a:lnTo>
+                <a:lnTo>
+                  <a:pt x="3462728" y="2758190"/>
+                </a:lnTo>
+                <a:lnTo>
+                  <a:pt x="14990" y="0"/>
+                </a:lnTo>
+                <a:close/>
+              </a:path>
+            </a:pathLst>
+          </a:custGeom>
+          <a:solidFill>
+            <a:schemeClr val="accent2"/>
+          </a:solidFill>
+        </p:spPr>
+        <p:style>
+          <a:lnRef idx="2">
+            <a:schemeClr val="accent1">
+              <a:shade val="50000"/>
+            </a:schemeClr>
+          </a:lnRef>
+          <a:fillRef idx="1">
+            <a:schemeClr val="accent1"/>
+          </a:fillRef>
+          <a:effectRef idx="0">
+            <a:schemeClr val="accent1"/>
+          </a:effectRef>
+          <a:fontRef idx="minor">
+            <a:schemeClr val="lt1"/>
+          </a:fontRef>
+        </p:style>
+        <p:txBody>
+          <a:bodyPr rtlCol="0" anchor="ctr"/>
+          <a:lstStyle/>
+          <a:p>
+            <a:pPr algn="ctr"/>
+            <a:endParaRPr lang="en-US"/>
+          </a:p>
+        </p:txBody>
+      </p:sp>
+      <p:sp>
+        <p:nvSpPr>
+          <p:cNvPr id="27" name="Freeform: Shape 26">
+            <a:extLst>
+              <a:ext uri="{FF2B5EF4-FFF2-40B4-BE49-F238E27FC236}">
+                <a16:creationId xmlns:a16="http://schemas.microsoft.com/office/drawing/2014/main" id="{122F4660-CB10-4D62-9796-67E5BE51CCA8}"/>
+              </a:ext>
+            </a:extLst>
+          </p:cNvPr>
+          <p:cNvSpPr/>
+          <p:nvPr/>
+        </p:nvSpPr>
+        <p:spPr>
+          <a:xfrm>
+            <a:off x="3375856" y="1360354"/>
+            <a:ext cx="1693888" cy="4916773"/>
+          </a:xfrm>
+          <a:custGeom>
+            <a:avLst/>
+            <a:gdLst>
+              <a:gd name="connsiteX0" fmla="*/ 0 w 1693888"/>
+              <a:gd name="connsiteY0" fmla="*/ 0 h 4916773"/>
+              <a:gd name="connsiteX1" fmla="*/ 1663908 w 1693888"/>
+              <a:gd name="connsiteY1" fmla="*/ 1124262 h 4916773"/>
+              <a:gd name="connsiteX2" fmla="*/ 1693888 w 1693888"/>
+              <a:gd name="connsiteY2" fmla="*/ 4916773 h 4916773"/>
+              <a:gd name="connsiteX3" fmla="*/ 14990 w 1693888"/>
+              <a:gd name="connsiteY3" fmla="*/ 3732550 h 4916773"/>
+              <a:gd name="connsiteX4" fmla="*/ 0 w 1693888"/>
+              <a:gd name="connsiteY4" fmla="*/ 0 h 4916773"/>
+            </a:gdLst>
+            <a:ahLst/>
+            <a:cxnLst>
+              <a:cxn ang="0">
+                <a:pos x="connsiteX0" y="connsiteY0"/>
+              </a:cxn>
+              <a:cxn ang="0">
+                <a:pos x="connsiteX1" y="connsiteY1"/>
+              </a:cxn>
+              <a:cxn ang="0">
+                <a:pos x="connsiteX2" y="connsiteY2"/>
+              </a:cxn>
+              <a:cxn ang="0">
+                <a:pos x="connsiteX3" y="connsiteY3"/>
+              </a:cxn>
+              <a:cxn ang="0">
+                <a:pos x="connsiteX4" y="connsiteY4"/>
+              </a:cxn>
+            </a:cxnLst>
+            <a:rect l="l" t="t" r="r" b="b"/>
+            <a:pathLst>
+              <a:path w="1693888" h="4916773">
+                <a:moveTo>
+                  <a:pt x="0" y="0"/>
+                </a:moveTo>
+                <a:lnTo>
+                  <a:pt x="1663908" y="1124262"/>
+                </a:lnTo>
+                <a:lnTo>
+                  <a:pt x="1693888" y="4916773"/>
+                </a:lnTo>
+                <a:lnTo>
+                  <a:pt x="14990" y="3732550"/>
+                </a:lnTo>
+                <a:cubicBezTo>
+                  <a:pt x="9993" y="2488367"/>
+                  <a:pt x="4997" y="1244183"/>
+                  <a:pt x="0" y="0"/>
+                </a:cubicBezTo>
+                <a:close/>
+              </a:path>
+            </a:pathLst>
+          </a:custGeom>
+        </p:spPr>
+        <p:style>
+          <a:lnRef idx="2">
+            <a:schemeClr val="accent1">
+              <a:shade val="50000"/>
+            </a:schemeClr>
+          </a:lnRef>
+          <a:fillRef idx="1">
+            <a:schemeClr val="accent1"/>
+          </a:fillRef>
+          <a:effectRef idx="0">
+            <a:schemeClr val="accent1"/>
+          </a:effectRef>
+          <a:fontRef idx="minor">
+            <a:schemeClr val="lt1"/>
+          </a:fontRef>
+        </p:style>
+        <p:txBody>
+          <a:bodyPr rtlCol="0" anchor="ctr"/>
+          <a:lstStyle/>
+          <a:p>
+            <a:pPr algn="ctr"/>
+            <a:endParaRPr lang="en-US"/>
+          </a:p>
+        </p:txBody>
+      </p:sp>
+      <p:sp>
+        <p:nvSpPr>
+          <p:cNvPr id="6" name="Oval 5">
+            <a:extLst>
+              <a:ext uri="{FF2B5EF4-FFF2-40B4-BE49-F238E27FC236}">
+                <a16:creationId xmlns:a16="http://schemas.microsoft.com/office/drawing/2014/main" id="{8F956C27-C891-443A-9EDA-E2D694E219F6}"/>
+              </a:ext>
+            </a:extLst>
+          </p:cNvPr>
+          <p:cNvSpPr/>
+          <p:nvPr/>
+        </p:nvSpPr>
+        <p:spPr>
+          <a:xfrm>
+            <a:off x="3155598" y="1141085"/>
+            <a:ext cx="438539" cy="438539"/>
+          </a:xfrm>
+          <a:prstGeom prst="ellipse">
+            <a:avLst/>
+          </a:prstGeom>
+        </p:spPr>
+        <p:style>
+          <a:lnRef idx="2">
+            <a:schemeClr val="accent1">
+              <a:shade val="50000"/>
+            </a:schemeClr>
+          </a:lnRef>
+          <a:fillRef idx="1">
+            <a:schemeClr val="accent1"/>
+          </a:fillRef>
+          <a:effectRef idx="0">
+            <a:schemeClr val="accent1"/>
+          </a:effectRef>
+          <a:fontRef idx="minor">
+            <a:schemeClr val="lt1"/>
+          </a:fontRef>
+        </p:style>
+        <p:txBody>
+          <a:bodyPr rtlCol="0" anchor="ctr"/>
+          <a:lstStyle/>
+          <a:p>
+            <a:pPr algn="ctr"/>
+            <a:r>
+              <a:rPr lang="en-US" dirty="0"/>
+              <a:t>1</a:t>
+            </a:r>
+          </a:p>
+        </p:txBody>
+      </p:sp>
+      <p:sp>
+        <p:nvSpPr>
+          <p:cNvPr id="8" name="Oval 7">
+            <a:extLst>
+              <a:ext uri="{FF2B5EF4-FFF2-40B4-BE49-F238E27FC236}">
+                <a16:creationId xmlns:a16="http://schemas.microsoft.com/office/drawing/2014/main" id="{6B4EF6F6-C7B4-4BC6-87DC-8D5264A641A3}"/>
+              </a:ext>
+            </a:extLst>
+          </p:cNvPr>
+          <p:cNvSpPr/>
+          <p:nvPr/>
+        </p:nvSpPr>
+        <p:spPr>
+          <a:xfrm>
+            <a:off x="4781966" y="2310317"/>
+            <a:ext cx="438539" cy="438539"/>
+          </a:xfrm>
+          <a:prstGeom prst="ellipse">
+            <a:avLst/>
+          </a:prstGeom>
+        </p:spPr>
+        <p:style>
+          <a:lnRef idx="2">
+            <a:schemeClr val="accent1">
+              <a:shade val="50000"/>
+            </a:schemeClr>
+          </a:lnRef>
+          <a:fillRef idx="1">
+            <a:schemeClr val="accent1"/>
+          </a:fillRef>
+          <a:effectRef idx="0">
+            <a:schemeClr val="accent1"/>
+          </a:effectRef>
+          <a:fontRef idx="minor">
+            <a:schemeClr val="lt1"/>
+          </a:fontRef>
+        </p:style>
+        <p:txBody>
+          <a:bodyPr rtlCol="0" anchor="ctr"/>
+          <a:lstStyle/>
+          <a:p>
+            <a:pPr algn="ctr"/>
+            <a:r>
+              <a:rPr lang="en-US" dirty="0"/>
+              <a:t>2</a:t>
+            </a:r>
+          </a:p>
+        </p:txBody>
+      </p:sp>
+      <p:sp>
+        <p:nvSpPr>
+          <p:cNvPr id="21" name="TextBox 20">
+            <a:extLst>
+              <a:ext uri="{FF2B5EF4-FFF2-40B4-BE49-F238E27FC236}">
+                <a16:creationId xmlns:a16="http://schemas.microsoft.com/office/drawing/2014/main" id="{9AC48180-DBF3-46DC-A76A-0A0BA0EFD406}"/>
+              </a:ext>
+            </a:extLst>
+          </p:cNvPr>
+          <p:cNvSpPr txBox="1"/>
+          <p:nvPr/>
+        </p:nvSpPr>
+        <p:spPr>
+          <a:xfrm>
+            <a:off x="317241" y="289249"/>
+            <a:ext cx="793807" cy="369332"/>
+          </a:xfrm>
+          <a:prstGeom prst="rect">
+            <a:avLst/>
+          </a:prstGeom>
+          <a:noFill/>
+        </p:spPr>
+        <p:txBody>
+          <a:bodyPr wrap="none" rtlCol="0">
+            <a:spAutoFit/>
+          </a:bodyPr>
+          <a:lstStyle/>
+          <a:p>
+            <a:r>
+              <a:rPr lang="en-US" dirty="0"/>
+              <a:t>Case 5</a:t>
+            </a:r>
+          </a:p>
+        </p:txBody>
+      </p:sp>
+      <p:sp>
+        <p:nvSpPr>
+          <p:cNvPr id="31" name="Oval 30">
+            <a:extLst>
+              <a:ext uri="{FF2B5EF4-FFF2-40B4-BE49-F238E27FC236}">
+                <a16:creationId xmlns:a16="http://schemas.microsoft.com/office/drawing/2014/main" id="{9432EF9E-5227-4C6B-AF7B-EF67A1AAFE66}"/>
+              </a:ext>
+            </a:extLst>
+          </p:cNvPr>
+          <p:cNvSpPr/>
+          <p:nvPr/>
+        </p:nvSpPr>
+        <p:spPr>
+          <a:xfrm>
+            <a:off x="4781966" y="6057857"/>
+            <a:ext cx="438539" cy="438539"/>
+          </a:xfrm>
+          <a:prstGeom prst="ellipse">
+            <a:avLst/>
+          </a:prstGeom>
+        </p:spPr>
+        <p:style>
+          <a:lnRef idx="2">
+            <a:schemeClr val="accent1">
+              <a:shade val="50000"/>
+            </a:schemeClr>
+          </a:lnRef>
+          <a:fillRef idx="1">
+            <a:schemeClr val="accent1"/>
+          </a:fillRef>
+          <a:effectRef idx="0">
+            <a:schemeClr val="accent1"/>
+          </a:effectRef>
+          <a:fontRef idx="minor">
+            <a:schemeClr val="lt1"/>
+          </a:fontRef>
+        </p:style>
+        <p:txBody>
+          <a:bodyPr rtlCol="0" anchor="ctr"/>
+          <a:lstStyle/>
+          <a:p>
+            <a:pPr algn="ctr"/>
+            <a:r>
+              <a:rPr lang="en-US" dirty="0"/>
+              <a:t>3</a:t>
+            </a:r>
+          </a:p>
+        </p:txBody>
+      </p:sp>
+      <p:sp>
+        <p:nvSpPr>
+          <p:cNvPr id="33" name="Oval 32">
+            <a:extLst>
+              <a:ext uri="{FF2B5EF4-FFF2-40B4-BE49-F238E27FC236}">
+                <a16:creationId xmlns:a16="http://schemas.microsoft.com/office/drawing/2014/main" id="{FC75D5DB-A173-4F89-9F8D-821DF39E7082}"/>
+              </a:ext>
+            </a:extLst>
+          </p:cNvPr>
+          <p:cNvSpPr/>
+          <p:nvPr/>
+        </p:nvSpPr>
+        <p:spPr>
+          <a:xfrm>
+            <a:off x="3151832" y="4888626"/>
+            <a:ext cx="438539" cy="438539"/>
+          </a:xfrm>
+          <a:prstGeom prst="ellipse">
+            <a:avLst/>
+          </a:prstGeom>
+        </p:spPr>
+        <p:style>
+          <a:lnRef idx="2">
+            <a:schemeClr val="accent1">
+              <a:shade val="50000"/>
+            </a:schemeClr>
+          </a:lnRef>
+          <a:fillRef idx="1">
+            <a:schemeClr val="accent1"/>
+          </a:fillRef>
+          <a:effectRef idx="0">
+            <a:schemeClr val="accent1"/>
+          </a:effectRef>
+          <a:fontRef idx="minor">
+            <a:schemeClr val="lt1"/>
+          </a:fontRef>
+        </p:style>
+        <p:txBody>
+          <a:bodyPr rtlCol="0" anchor="ctr"/>
+          <a:lstStyle/>
+          <a:p>
+            <a:pPr algn="ctr"/>
+            <a:r>
+              <a:rPr lang="en-US" dirty="0"/>
+              <a:t>4</a:t>
+            </a:r>
+          </a:p>
+        </p:txBody>
+      </p:sp>
+      <p:sp>
+        <p:nvSpPr>
+          <p:cNvPr id="43" name="Oval 42">
+            <a:extLst>
+              <a:ext uri="{FF2B5EF4-FFF2-40B4-BE49-F238E27FC236}">
+                <a16:creationId xmlns:a16="http://schemas.microsoft.com/office/drawing/2014/main" id="{8EB071AF-0EFF-4E39-9796-D9D2E67C070D}"/>
+              </a:ext>
+            </a:extLst>
+          </p:cNvPr>
+          <p:cNvSpPr/>
+          <p:nvPr/>
+        </p:nvSpPr>
+        <p:spPr>
+          <a:xfrm>
+            <a:off x="6509503" y="1510334"/>
+            <a:ext cx="438539" cy="438539"/>
+          </a:xfrm>
+          <a:prstGeom prst="ellipse">
+            <a:avLst/>
+          </a:prstGeom>
+          <a:solidFill>
+            <a:schemeClr val="accent2"/>
+          </a:solidFill>
+        </p:spPr>
+        <p:style>
+          <a:lnRef idx="2">
+            <a:schemeClr val="accent1">
+              <a:shade val="50000"/>
+            </a:schemeClr>
+          </a:lnRef>
+          <a:fillRef idx="1">
+            <a:schemeClr val="accent1"/>
+          </a:fillRef>
+          <a:effectRef idx="0">
+            <a:schemeClr val="accent1"/>
+          </a:effectRef>
+          <a:fontRef idx="minor">
+            <a:schemeClr val="lt1"/>
+          </a:fontRef>
+        </p:style>
+        <p:txBody>
+          <a:bodyPr rtlCol="0" anchor="ctr"/>
+          <a:lstStyle/>
+          <a:p>
+            <a:pPr algn="ctr"/>
+            <a:r>
+              <a:rPr lang="en-US" dirty="0"/>
+              <a:t>6</a:t>
+            </a:r>
+          </a:p>
+        </p:txBody>
+      </p:sp>
+      <p:sp>
+        <p:nvSpPr>
+          <p:cNvPr id="45" name="Oval 44">
+            <a:extLst>
+              <a:ext uri="{FF2B5EF4-FFF2-40B4-BE49-F238E27FC236}">
+                <a16:creationId xmlns:a16="http://schemas.microsoft.com/office/drawing/2014/main" id="{2B6C262F-4845-4AEF-A1F5-CC2DDC9AA46B}"/>
+              </a:ext>
+            </a:extLst>
+          </p:cNvPr>
+          <p:cNvSpPr/>
+          <p:nvPr/>
+        </p:nvSpPr>
+        <p:spPr>
+          <a:xfrm>
+            <a:off x="9923988" y="4223308"/>
+            <a:ext cx="438539" cy="438539"/>
+          </a:xfrm>
+          <a:prstGeom prst="ellipse">
+            <a:avLst/>
+          </a:prstGeom>
+          <a:solidFill>
+            <a:schemeClr val="accent2"/>
+          </a:solidFill>
+        </p:spPr>
+        <p:style>
+          <a:lnRef idx="2">
+            <a:schemeClr val="accent1">
+              <a:shade val="50000"/>
+            </a:schemeClr>
+          </a:lnRef>
+          <a:fillRef idx="1">
+            <a:schemeClr val="accent1"/>
+          </a:fillRef>
+          <a:effectRef idx="0">
+            <a:schemeClr val="accent1"/>
+          </a:effectRef>
+          <a:fontRef idx="minor">
+            <a:schemeClr val="lt1"/>
+          </a:fontRef>
+        </p:style>
+        <p:txBody>
+          <a:bodyPr rtlCol="0" anchor="ctr"/>
+          <a:lstStyle/>
+          <a:p>
+            <a:pPr algn="ctr"/>
+            <a:r>
+              <a:rPr lang="en-US" dirty="0"/>
+              <a:t>5</a:t>
+            </a:r>
+          </a:p>
+        </p:txBody>
+      </p:sp>
+      <p:sp>
+        <p:nvSpPr>
+          <p:cNvPr id="47" name="Oval 46">
+            <a:extLst>
+              <a:ext uri="{FF2B5EF4-FFF2-40B4-BE49-F238E27FC236}">
+                <a16:creationId xmlns:a16="http://schemas.microsoft.com/office/drawing/2014/main" id="{7F7355E6-D8E9-44FE-907F-4C072FE2EAA1}"/>
+              </a:ext>
+            </a:extLst>
+          </p:cNvPr>
+          <p:cNvSpPr/>
+          <p:nvPr/>
+        </p:nvSpPr>
+        <p:spPr>
+          <a:xfrm>
+            <a:off x="9915200" y="5383375"/>
+            <a:ext cx="438539" cy="438539"/>
+          </a:xfrm>
+          <a:prstGeom prst="ellipse">
+            <a:avLst/>
+          </a:prstGeom>
+          <a:solidFill>
+            <a:schemeClr val="accent2"/>
+          </a:solidFill>
+        </p:spPr>
+        <p:style>
+          <a:lnRef idx="2">
+            <a:schemeClr val="accent1">
+              <a:shade val="50000"/>
+            </a:schemeClr>
+          </a:lnRef>
+          <a:fillRef idx="1">
+            <a:schemeClr val="accent1"/>
+          </a:fillRef>
+          <a:effectRef idx="0">
+            <a:schemeClr val="accent1"/>
+          </a:effectRef>
+          <a:fontRef idx="minor">
+            <a:schemeClr val="lt1"/>
+          </a:fontRef>
+        </p:style>
+        <p:txBody>
+          <a:bodyPr rtlCol="0" anchor="ctr"/>
+          <a:lstStyle/>
+          <a:p>
+            <a:pPr algn="ctr"/>
+            <a:r>
+              <a:rPr lang="en-US" dirty="0"/>
+              <a:t>8</a:t>
+            </a:r>
+          </a:p>
+        </p:txBody>
+      </p:sp>
+      <p:sp>
+        <p:nvSpPr>
+          <p:cNvPr id="49" name="Oval 48">
+            <a:extLst>
+              <a:ext uri="{FF2B5EF4-FFF2-40B4-BE49-F238E27FC236}">
+                <a16:creationId xmlns:a16="http://schemas.microsoft.com/office/drawing/2014/main" id="{AD659D91-F502-4322-ABDE-40E85F63F01F}"/>
+              </a:ext>
+            </a:extLst>
+          </p:cNvPr>
+          <p:cNvSpPr/>
+          <p:nvPr/>
+        </p:nvSpPr>
+        <p:spPr>
+          <a:xfrm>
+            <a:off x="6461260" y="2795586"/>
+            <a:ext cx="438539" cy="438539"/>
+          </a:xfrm>
+          <a:prstGeom prst="ellipse">
+            <a:avLst/>
+          </a:prstGeom>
+          <a:solidFill>
+            <a:schemeClr val="accent2"/>
+          </a:solidFill>
+        </p:spPr>
+        <p:style>
+          <a:lnRef idx="2">
+            <a:schemeClr val="accent1">
+              <a:shade val="50000"/>
+            </a:schemeClr>
+          </a:lnRef>
+          <a:fillRef idx="1">
+            <a:schemeClr val="accent1"/>
+          </a:fillRef>
+          <a:effectRef idx="0">
+            <a:schemeClr val="accent1"/>
+          </a:effectRef>
+          <a:fontRef idx="minor">
+            <a:schemeClr val="lt1"/>
+          </a:fontRef>
+        </p:style>
+        <p:txBody>
+          <a:bodyPr rtlCol="0" anchor="ctr"/>
+          <a:lstStyle/>
+          <a:p>
+            <a:pPr algn="ctr"/>
+            <a:r>
+              <a:rPr lang="en-US" dirty="0"/>
+              <a:t>7</a:t>
+            </a:r>
+          </a:p>
+        </p:txBody>
+      </p:sp>
+      <p:sp>
+        <p:nvSpPr>
+          <p:cNvPr id="54" name="Arrow: Left-Right 53">
+            <a:extLst>
+              <a:ext uri="{FF2B5EF4-FFF2-40B4-BE49-F238E27FC236}">
+                <a16:creationId xmlns:a16="http://schemas.microsoft.com/office/drawing/2014/main" id="{E8ACE11C-4491-4A03-A55A-D877311E8345}"/>
+              </a:ext>
+            </a:extLst>
+          </p:cNvPr>
+          <p:cNvSpPr/>
+          <p:nvPr/>
+        </p:nvSpPr>
+        <p:spPr>
+          <a:xfrm>
+            <a:off x="5484105" y="3453394"/>
+            <a:ext cx="1216152" cy="484632"/>
+          </a:xfrm>
+          <a:prstGeom prst="leftRightArrow">
+            <a:avLst/>
+          </a:prstGeom>
+          <a:solidFill>
+            <a:schemeClr val="bg1"/>
+          </a:solidFill>
+        </p:spPr>
+        <p:style>
+          <a:lnRef idx="2">
+            <a:schemeClr val="accent1">
+              <a:shade val="50000"/>
+            </a:schemeClr>
+          </a:lnRef>
+          <a:fillRef idx="1">
+            <a:schemeClr val="accent1"/>
+          </a:fillRef>
+          <a:effectRef idx="0">
+            <a:schemeClr val="accent1"/>
+          </a:effectRef>
+          <a:fontRef idx="minor">
+            <a:schemeClr val="lt1"/>
+          </a:fontRef>
+        </p:style>
+        <p:txBody>
+          <a:bodyPr rtlCol="0" anchor="ctr"/>
+          <a:lstStyle/>
+          <a:p>
+            <a:pPr algn="ctr"/>
+            <a:endParaRPr lang="en-US"/>
+          </a:p>
+        </p:txBody>
+      </p:sp>
+      <p:sp>
+        <p:nvSpPr>
+          <p:cNvPr id="2" name="Freeform: Shape 1">
+            <a:extLst>
+              <a:ext uri="{FF2B5EF4-FFF2-40B4-BE49-F238E27FC236}">
+                <a16:creationId xmlns:a16="http://schemas.microsoft.com/office/drawing/2014/main" id="{790E4172-F5F3-4D28-9329-CDD93B50C4F1}"/>
+              </a:ext>
+            </a:extLst>
+          </p:cNvPr>
+          <p:cNvSpPr/>
+          <p:nvPr/>
+        </p:nvSpPr>
+        <p:spPr>
+          <a:xfrm>
+            <a:off x="7540052" y="3642610"/>
+            <a:ext cx="1723869" cy="2698229"/>
+          </a:xfrm>
+          <a:custGeom>
+            <a:avLst/>
+            <a:gdLst>
+              <a:gd name="connsiteX0" fmla="*/ 0 w 1723869"/>
+              <a:gd name="connsiteY0" fmla="*/ 0 h 2698229"/>
+              <a:gd name="connsiteX1" fmla="*/ 0 w 1723869"/>
+              <a:gd name="connsiteY1" fmla="*/ 1543987 h 2698229"/>
+              <a:gd name="connsiteX2" fmla="*/ 1693889 w 1723869"/>
+              <a:gd name="connsiteY2" fmla="*/ 2698229 h 2698229"/>
+              <a:gd name="connsiteX3" fmla="*/ 1723869 w 1723869"/>
+              <a:gd name="connsiteY3" fmla="*/ 1274164 h 2698229"/>
+              <a:gd name="connsiteX4" fmla="*/ 0 w 1723869"/>
+              <a:gd name="connsiteY4" fmla="*/ 0 h 2698229"/>
+            </a:gdLst>
+            <a:ahLst/>
+            <a:cxnLst>
+              <a:cxn ang="0">
+                <a:pos x="connsiteX0" y="connsiteY0"/>
+              </a:cxn>
+              <a:cxn ang="0">
+                <a:pos x="connsiteX1" y="connsiteY1"/>
+              </a:cxn>
+              <a:cxn ang="0">
+                <a:pos x="connsiteX2" y="connsiteY2"/>
+              </a:cxn>
+              <a:cxn ang="0">
+                <a:pos x="connsiteX3" y="connsiteY3"/>
+              </a:cxn>
+              <a:cxn ang="0">
+                <a:pos x="connsiteX4" y="connsiteY4"/>
+              </a:cxn>
+            </a:cxnLst>
+            <a:rect l="l" t="t" r="r" b="b"/>
+            <a:pathLst>
+              <a:path w="1723869" h="2698229">
+                <a:moveTo>
+                  <a:pt x="0" y="0"/>
+                </a:moveTo>
+                <a:lnTo>
+                  <a:pt x="0" y="1543987"/>
+                </a:lnTo>
+                <a:lnTo>
+                  <a:pt x="1693889" y="2698229"/>
+                </a:lnTo>
+                <a:lnTo>
+                  <a:pt x="1723869" y="1274164"/>
+                </a:lnTo>
+                <a:lnTo>
+                  <a:pt x="0" y="0"/>
+                </a:lnTo>
+                <a:close/>
+              </a:path>
+            </a:pathLst>
+          </a:custGeom>
+          <a:solidFill>
+            <a:srgbClr val="7030A0"/>
+          </a:solidFill>
+        </p:spPr>
+        <p:style>
+          <a:lnRef idx="2">
+            <a:schemeClr val="accent1">
+              <a:shade val="50000"/>
+            </a:schemeClr>
+          </a:lnRef>
+          <a:fillRef idx="1">
+            <a:schemeClr val="accent1"/>
+          </a:fillRef>
+          <a:effectRef idx="0">
+            <a:schemeClr val="accent1"/>
+          </a:effectRef>
+          <a:fontRef idx="minor">
+            <a:schemeClr val="lt1"/>
+          </a:fontRef>
+        </p:style>
+        <p:txBody>
+          <a:bodyPr rtlCol="0" anchor="ctr"/>
+          <a:lstStyle/>
+          <a:p>
+            <a:pPr algn="ctr"/>
+            <a:endParaRPr lang="en-US"/>
+          </a:p>
+        </p:txBody>
+      </p:sp>
+      <p:sp>
+        <p:nvSpPr>
+          <p:cNvPr id="39" name="Oval 38">
+            <a:extLst>
+              <a:ext uri="{FF2B5EF4-FFF2-40B4-BE49-F238E27FC236}">
+                <a16:creationId xmlns:a16="http://schemas.microsoft.com/office/drawing/2014/main" id="{F7455F89-F0D0-457B-B3B0-29FAC39762AE}"/>
+              </a:ext>
+            </a:extLst>
+          </p:cNvPr>
+          <p:cNvSpPr/>
+          <p:nvPr/>
+        </p:nvSpPr>
+        <p:spPr>
+          <a:xfrm>
+            <a:off x="9049431" y="6057857"/>
+            <a:ext cx="438539" cy="438539"/>
+          </a:xfrm>
+          <a:prstGeom prst="ellipse">
+            <a:avLst/>
+          </a:prstGeom>
+        </p:spPr>
+        <p:style>
+          <a:lnRef idx="2">
+            <a:schemeClr val="accent1">
+              <a:shade val="50000"/>
+            </a:schemeClr>
+          </a:lnRef>
+          <a:fillRef idx="1">
+            <a:schemeClr val="accent1"/>
+          </a:fillRef>
+          <a:effectRef idx="0">
+            <a:schemeClr val="accent1"/>
+          </a:effectRef>
+          <a:fontRef idx="minor">
+            <a:schemeClr val="lt1"/>
+          </a:fontRef>
+        </p:style>
+        <p:txBody>
+          <a:bodyPr rtlCol="0" anchor="ctr"/>
+          <a:lstStyle/>
+          <a:p>
+            <a:pPr algn="ctr"/>
+            <a:r>
+              <a:rPr lang="en-US" dirty="0"/>
+              <a:t>3</a:t>
+            </a:r>
+          </a:p>
+        </p:txBody>
+      </p:sp>
+      <p:sp>
+        <p:nvSpPr>
+          <p:cNvPr id="41" name="Oval 40">
+            <a:extLst>
+              <a:ext uri="{FF2B5EF4-FFF2-40B4-BE49-F238E27FC236}">
+                <a16:creationId xmlns:a16="http://schemas.microsoft.com/office/drawing/2014/main" id="{BBBDC135-5B0C-4E4A-9D2D-71BD8C27E44D}"/>
+              </a:ext>
+            </a:extLst>
+          </p:cNvPr>
+          <p:cNvSpPr/>
+          <p:nvPr/>
+        </p:nvSpPr>
+        <p:spPr>
+          <a:xfrm>
+            <a:off x="7355543" y="4959820"/>
+            <a:ext cx="438539" cy="438539"/>
+          </a:xfrm>
+          <a:prstGeom prst="ellipse">
+            <a:avLst/>
+          </a:prstGeom>
+        </p:spPr>
+        <p:style>
+          <a:lnRef idx="2">
+            <a:schemeClr val="accent1">
+              <a:shade val="50000"/>
+            </a:schemeClr>
+          </a:lnRef>
+          <a:fillRef idx="1">
+            <a:schemeClr val="accent1"/>
+          </a:fillRef>
+          <a:effectRef idx="0">
+            <a:schemeClr val="accent1"/>
+          </a:effectRef>
+          <a:fontRef idx="minor">
+            <a:schemeClr val="lt1"/>
+          </a:fontRef>
+        </p:style>
+        <p:txBody>
+          <a:bodyPr rtlCol="0" anchor="ctr"/>
+          <a:lstStyle/>
+          <a:p>
+            <a:pPr algn="ctr"/>
+            <a:r>
+              <a:rPr lang="en-US" dirty="0"/>
+              <a:t>4</a:t>
+            </a:r>
+          </a:p>
+        </p:txBody>
+      </p:sp>
+      <p:sp>
+        <p:nvSpPr>
+          <p:cNvPr id="11" name="Oval 10">
+            <a:extLst>
+              <a:ext uri="{FF2B5EF4-FFF2-40B4-BE49-F238E27FC236}">
+                <a16:creationId xmlns:a16="http://schemas.microsoft.com/office/drawing/2014/main" id="{4AB3B3E3-9E9D-4225-B601-8C8E36C2E0BF}"/>
+              </a:ext>
+            </a:extLst>
+          </p:cNvPr>
+          <p:cNvSpPr/>
+          <p:nvPr/>
+        </p:nvSpPr>
+        <p:spPr>
+          <a:xfrm>
+            <a:off x="7367935" y="3389612"/>
+            <a:ext cx="438539" cy="438539"/>
+          </a:xfrm>
+          <a:prstGeom prst="ellipse">
+            <a:avLst/>
+          </a:prstGeom>
+          <a:solidFill>
+            <a:srgbClr val="7030A0"/>
+          </a:solidFill>
+        </p:spPr>
+        <p:style>
+          <a:lnRef idx="2">
+            <a:schemeClr val="accent1">
+              <a:shade val="50000"/>
+            </a:schemeClr>
+          </a:lnRef>
+          <a:fillRef idx="1">
+            <a:schemeClr val="accent1"/>
+          </a:fillRef>
+          <a:effectRef idx="0">
+            <a:schemeClr val="accent1"/>
+          </a:effectRef>
+          <a:fontRef idx="minor">
+            <a:schemeClr val="lt1"/>
+          </a:fontRef>
+        </p:style>
+        <p:txBody>
+          <a:bodyPr rtlCol="0" anchor="ctr"/>
+          <a:lstStyle/>
+          <a:p>
+            <a:pPr algn="ctr"/>
+            <a:r>
+              <a:rPr lang="en-US" dirty="0"/>
+              <a:t>10</a:t>
+            </a:r>
+          </a:p>
+        </p:txBody>
+      </p:sp>
+      <p:sp>
+        <p:nvSpPr>
+          <p:cNvPr id="12" name="Oval 11">
+            <a:extLst>
+              <a:ext uri="{FF2B5EF4-FFF2-40B4-BE49-F238E27FC236}">
+                <a16:creationId xmlns:a16="http://schemas.microsoft.com/office/drawing/2014/main" id="{42193632-60A0-4A86-9E8C-FE3873C31CEC}"/>
+              </a:ext>
+            </a:extLst>
+          </p:cNvPr>
+          <p:cNvSpPr/>
+          <p:nvPr/>
+        </p:nvSpPr>
+        <p:spPr>
+          <a:xfrm>
+            <a:off x="9025890" y="4740550"/>
+            <a:ext cx="438539" cy="438539"/>
+          </a:xfrm>
+          <a:prstGeom prst="ellipse">
+            <a:avLst/>
+          </a:prstGeom>
+          <a:solidFill>
+            <a:srgbClr val="7030A0"/>
+          </a:solidFill>
+        </p:spPr>
+        <p:style>
+          <a:lnRef idx="2">
+            <a:schemeClr val="accent1">
+              <a:shade val="50000"/>
+            </a:schemeClr>
+          </a:lnRef>
+          <a:fillRef idx="1">
+            <a:schemeClr val="accent1"/>
+          </a:fillRef>
+          <a:effectRef idx="0">
+            <a:schemeClr val="accent1"/>
+          </a:effectRef>
+          <a:fontRef idx="minor">
+            <a:schemeClr val="lt1"/>
+          </a:fontRef>
+        </p:style>
+        <p:txBody>
+          <a:bodyPr rtlCol="0" anchor="ctr"/>
+          <a:lstStyle/>
+          <a:p>
+            <a:pPr algn="ctr"/>
+            <a:r>
+              <a:rPr lang="en-US" dirty="0"/>
+              <a:t>9</a:t>
+            </a:r>
+          </a:p>
+        </p:txBody>
+      </p:sp>
+      <p:sp>
+        <p:nvSpPr>
+          <p:cNvPr id="3" name="Freeform: Shape 2">
+            <a:extLst>
+              <a:ext uri="{FF2B5EF4-FFF2-40B4-BE49-F238E27FC236}">
+                <a16:creationId xmlns:a16="http://schemas.microsoft.com/office/drawing/2014/main" id="{1DBF6EC7-79DD-4CF0-ADFB-823B4E326CA7}"/>
+              </a:ext>
+            </a:extLst>
+          </p:cNvPr>
+          <p:cNvSpPr/>
+          <p:nvPr/>
+        </p:nvSpPr>
+        <p:spPr>
+          <a:xfrm>
+            <a:off x="7555043" y="1274164"/>
+            <a:ext cx="1753849" cy="2518347"/>
+          </a:xfrm>
+          <a:custGeom>
+            <a:avLst/>
+            <a:gdLst>
+              <a:gd name="connsiteX0" fmla="*/ 1723868 w 1753849"/>
+              <a:gd name="connsiteY0" fmla="*/ 1274164 h 2518347"/>
+              <a:gd name="connsiteX1" fmla="*/ 29980 w 1753849"/>
+              <a:gd name="connsiteY1" fmla="*/ 0 h 2518347"/>
+              <a:gd name="connsiteX2" fmla="*/ 0 w 1753849"/>
+              <a:gd name="connsiteY2" fmla="*/ 1184223 h 2518347"/>
+              <a:gd name="connsiteX3" fmla="*/ 1753849 w 1753849"/>
+              <a:gd name="connsiteY3" fmla="*/ 2518347 h 2518347"/>
+              <a:gd name="connsiteX4" fmla="*/ 1723868 w 1753849"/>
+              <a:gd name="connsiteY4" fmla="*/ 1274164 h 2518347"/>
+            </a:gdLst>
+            <a:ahLst/>
+            <a:cxnLst>
+              <a:cxn ang="0">
+                <a:pos x="connsiteX0" y="connsiteY0"/>
+              </a:cxn>
+              <a:cxn ang="0">
+                <a:pos x="connsiteX1" y="connsiteY1"/>
+              </a:cxn>
+              <a:cxn ang="0">
+                <a:pos x="connsiteX2" y="connsiteY2"/>
+              </a:cxn>
+              <a:cxn ang="0">
+                <a:pos x="connsiteX3" y="connsiteY3"/>
+              </a:cxn>
+              <a:cxn ang="0">
+                <a:pos x="connsiteX4" y="connsiteY4"/>
+              </a:cxn>
+            </a:cxnLst>
+            <a:rect l="l" t="t" r="r" b="b"/>
+            <a:pathLst>
+              <a:path w="1753849" h="2518347">
+                <a:moveTo>
+                  <a:pt x="1723868" y="1274164"/>
+                </a:moveTo>
+                <a:lnTo>
+                  <a:pt x="29980" y="0"/>
+                </a:lnTo>
+                <a:lnTo>
+                  <a:pt x="0" y="1184223"/>
+                </a:lnTo>
+                <a:lnTo>
+                  <a:pt x="1753849" y="2518347"/>
+                </a:lnTo>
+                <a:lnTo>
+                  <a:pt x="1723868" y="1274164"/>
+                </a:lnTo>
+                <a:close/>
+              </a:path>
+            </a:pathLst>
+          </a:custGeom>
+          <a:solidFill>
+            <a:schemeClr val="accent4">
+              <a:lumMod val="60000"/>
+              <a:lumOff val="40000"/>
+            </a:schemeClr>
+          </a:solidFill>
+        </p:spPr>
+        <p:style>
+          <a:lnRef idx="2">
+            <a:schemeClr val="accent1">
+              <a:shade val="50000"/>
+            </a:schemeClr>
+          </a:lnRef>
+          <a:fillRef idx="1">
+            <a:schemeClr val="accent1"/>
+          </a:fillRef>
+          <a:effectRef idx="0">
+            <a:schemeClr val="accent1"/>
+          </a:effectRef>
+          <a:fontRef idx="minor">
+            <a:schemeClr val="lt1"/>
+          </a:fontRef>
+        </p:style>
+        <p:txBody>
+          <a:bodyPr rtlCol="0" anchor="ctr"/>
+          <a:lstStyle/>
+          <a:p>
+            <a:pPr algn="ctr"/>
+            <a:endParaRPr lang="en-US"/>
+          </a:p>
+        </p:txBody>
+      </p:sp>
+      <p:sp>
+        <p:nvSpPr>
+          <p:cNvPr id="35" name="Oval 34">
+            <a:extLst>
+              <a:ext uri="{FF2B5EF4-FFF2-40B4-BE49-F238E27FC236}">
+                <a16:creationId xmlns:a16="http://schemas.microsoft.com/office/drawing/2014/main" id="{294CF03A-00F3-470A-BE3C-245892FCED22}"/>
+              </a:ext>
+            </a:extLst>
+          </p:cNvPr>
+          <p:cNvSpPr/>
+          <p:nvPr/>
+        </p:nvSpPr>
+        <p:spPr>
+          <a:xfrm>
+            <a:off x="7355543" y="1105529"/>
+            <a:ext cx="438539" cy="438539"/>
+          </a:xfrm>
+          <a:prstGeom prst="ellipse">
+            <a:avLst/>
+          </a:prstGeom>
+        </p:spPr>
+        <p:style>
+          <a:lnRef idx="2">
+            <a:schemeClr val="accent1">
+              <a:shade val="50000"/>
+            </a:schemeClr>
+          </a:lnRef>
+          <a:fillRef idx="1">
+            <a:schemeClr val="accent1"/>
+          </a:fillRef>
+          <a:effectRef idx="0">
+            <a:schemeClr val="accent1"/>
+          </a:effectRef>
+          <a:fontRef idx="minor">
+            <a:schemeClr val="lt1"/>
+          </a:fontRef>
+        </p:style>
+        <p:txBody>
+          <a:bodyPr rtlCol="0" anchor="ctr"/>
+          <a:lstStyle/>
+          <a:p>
+            <a:pPr algn="ctr"/>
+            <a:r>
+              <a:rPr lang="en-US" dirty="0"/>
+              <a:t>1</a:t>
+            </a:r>
+          </a:p>
+        </p:txBody>
+      </p:sp>
+      <p:sp>
+        <p:nvSpPr>
+          <p:cNvPr id="37" name="Oval 36">
+            <a:extLst>
+              <a:ext uri="{FF2B5EF4-FFF2-40B4-BE49-F238E27FC236}">
+                <a16:creationId xmlns:a16="http://schemas.microsoft.com/office/drawing/2014/main" id="{3D649455-5F46-4E1A-85F9-0D83C4EC30DA}"/>
+              </a:ext>
+            </a:extLst>
+          </p:cNvPr>
+          <p:cNvSpPr/>
+          <p:nvPr/>
+        </p:nvSpPr>
+        <p:spPr>
+          <a:xfrm>
+            <a:off x="9049431" y="2310317"/>
+            <a:ext cx="438539" cy="438539"/>
+          </a:xfrm>
+          <a:prstGeom prst="ellipse">
+            <a:avLst/>
+          </a:prstGeom>
+        </p:spPr>
+        <p:style>
+          <a:lnRef idx="2">
+            <a:schemeClr val="accent1">
+              <a:shade val="50000"/>
+            </a:schemeClr>
+          </a:lnRef>
+          <a:fillRef idx="1">
+            <a:schemeClr val="accent1"/>
+          </a:fillRef>
+          <a:effectRef idx="0">
+            <a:schemeClr val="accent1"/>
+          </a:effectRef>
+          <a:fontRef idx="minor">
+            <a:schemeClr val="lt1"/>
+          </a:fontRef>
+        </p:style>
+        <p:txBody>
+          <a:bodyPr rtlCol="0" anchor="ctr"/>
+          <a:lstStyle/>
+          <a:p>
+            <a:pPr algn="ctr"/>
+            <a:r>
+              <a:rPr lang="en-US" dirty="0"/>
+              <a:t>2</a:t>
+            </a:r>
+          </a:p>
+        </p:txBody>
+      </p:sp>
+      <p:sp>
+        <p:nvSpPr>
+          <p:cNvPr id="4" name="Oval 3">
+            <a:extLst>
+              <a:ext uri="{FF2B5EF4-FFF2-40B4-BE49-F238E27FC236}">
+                <a16:creationId xmlns:a16="http://schemas.microsoft.com/office/drawing/2014/main" id="{DC3B214A-AF33-4EF4-81D9-0971AC63F5D3}"/>
+              </a:ext>
+            </a:extLst>
+          </p:cNvPr>
+          <p:cNvSpPr/>
+          <p:nvPr/>
+        </p:nvSpPr>
+        <p:spPr>
+          <a:xfrm>
+            <a:off x="9044651" y="3562839"/>
+            <a:ext cx="438539" cy="438539"/>
+          </a:xfrm>
+          <a:prstGeom prst="ellipse">
+            <a:avLst/>
+          </a:prstGeom>
+          <a:solidFill>
+            <a:schemeClr val="accent4">
+              <a:lumMod val="60000"/>
+              <a:lumOff val="40000"/>
+            </a:schemeClr>
+          </a:solidFill>
+        </p:spPr>
+        <p:style>
+          <a:lnRef idx="2">
+            <a:schemeClr val="accent1">
+              <a:shade val="50000"/>
+            </a:schemeClr>
+          </a:lnRef>
+          <a:fillRef idx="1">
+            <a:schemeClr val="accent1"/>
+          </a:fillRef>
+          <a:effectRef idx="0">
+            <a:schemeClr val="accent1"/>
+          </a:effectRef>
+          <a:fontRef idx="minor">
+            <a:schemeClr val="lt1"/>
+          </a:fontRef>
+        </p:style>
+        <p:txBody>
+          <a:bodyPr rtlCol="0" anchor="ctr"/>
+          <a:lstStyle/>
+          <a:p>
+            <a:pPr algn="ctr"/>
+            <a:r>
+              <a:rPr lang="en-US" dirty="0"/>
+              <a:t>12</a:t>
+            </a:r>
+          </a:p>
+        </p:txBody>
+      </p:sp>
+      <p:sp>
+        <p:nvSpPr>
+          <p:cNvPr id="7" name="Oval 6">
+            <a:extLst>
+              <a:ext uri="{FF2B5EF4-FFF2-40B4-BE49-F238E27FC236}">
+                <a16:creationId xmlns:a16="http://schemas.microsoft.com/office/drawing/2014/main" id="{9B7AE4E2-563A-4098-A60E-15FEAD17C0BF}"/>
+              </a:ext>
+            </a:extLst>
+          </p:cNvPr>
+          <p:cNvSpPr/>
+          <p:nvPr/>
+        </p:nvSpPr>
+        <p:spPr>
+          <a:xfrm>
+            <a:off x="7335773" y="2261686"/>
+            <a:ext cx="438539" cy="438539"/>
+          </a:xfrm>
+          <a:prstGeom prst="ellipse">
+            <a:avLst/>
+          </a:prstGeom>
+          <a:solidFill>
+            <a:schemeClr val="accent4">
+              <a:lumMod val="60000"/>
+              <a:lumOff val="40000"/>
+            </a:schemeClr>
+          </a:solidFill>
+        </p:spPr>
+        <p:style>
+          <a:lnRef idx="2">
+            <a:schemeClr val="accent1">
+              <a:shade val="50000"/>
+            </a:schemeClr>
+          </a:lnRef>
+          <a:fillRef idx="1">
+            <a:schemeClr val="accent1"/>
+          </a:fillRef>
+          <a:effectRef idx="0">
+            <a:schemeClr val="accent1"/>
+          </a:effectRef>
+          <a:fontRef idx="minor">
+            <a:schemeClr val="lt1"/>
+          </a:fontRef>
+        </p:style>
+        <p:txBody>
+          <a:bodyPr rtlCol="0" anchor="ctr"/>
+          <a:lstStyle/>
+          <a:p>
+            <a:pPr algn="ctr"/>
+            <a:r>
+              <a:rPr lang="en-US" dirty="0"/>
+              <a:t>11</a:t>
+            </a:r>
+          </a:p>
+        </p:txBody>
+      </p:sp>
+      <p:sp>
+        <p:nvSpPr>
+          <p:cNvPr id="9" name="TextBox 8">
+            <a:extLst>
+              <a:ext uri="{FF2B5EF4-FFF2-40B4-BE49-F238E27FC236}">
+                <a16:creationId xmlns:a16="http://schemas.microsoft.com/office/drawing/2014/main" id="{F064A732-19A3-4833-9C8B-9D530B9F9D80}"/>
+              </a:ext>
+            </a:extLst>
+          </p:cNvPr>
+          <p:cNvSpPr txBox="1"/>
+          <p:nvPr/>
+        </p:nvSpPr>
+        <p:spPr>
+          <a:xfrm>
+            <a:off x="9044651" y="6515980"/>
+            <a:ext cx="301686" cy="369332"/>
+          </a:xfrm>
+          <a:prstGeom prst="rect">
+            <a:avLst/>
+          </a:prstGeom>
+          <a:noFill/>
+        </p:spPr>
+        <p:txBody>
+          <a:bodyPr wrap="none" rtlCol="0">
+            <a:spAutoFit/>
+          </a:bodyPr>
+          <a:lstStyle/>
+          <a:p>
+            <a:r>
+              <a:rPr lang="en-US" dirty="0"/>
+              <a:t>1</a:t>
+            </a:r>
+          </a:p>
+        </p:txBody>
+      </p:sp>
+      <p:sp>
+        <p:nvSpPr>
+          <p:cNvPr id="15" name="TextBox 14">
+            <a:extLst>
+              <a:ext uri="{FF2B5EF4-FFF2-40B4-BE49-F238E27FC236}">
+                <a16:creationId xmlns:a16="http://schemas.microsoft.com/office/drawing/2014/main" id="{CFCB0513-DF1F-4632-9DB3-F98141A3F621}"/>
+              </a:ext>
+            </a:extLst>
+          </p:cNvPr>
+          <p:cNvSpPr txBox="1"/>
+          <p:nvPr/>
+        </p:nvSpPr>
+        <p:spPr>
+          <a:xfrm>
+            <a:off x="7422072" y="5427951"/>
+            <a:ext cx="301686" cy="369332"/>
+          </a:xfrm>
+          <a:prstGeom prst="rect">
+            <a:avLst/>
+          </a:prstGeom>
+          <a:noFill/>
+        </p:spPr>
+        <p:txBody>
+          <a:bodyPr wrap="none" rtlCol="0">
+            <a:spAutoFit/>
+          </a:bodyPr>
+          <a:lstStyle/>
+          <a:p>
+            <a:r>
+              <a:rPr lang="en-US" dirty="0"/>
+              <a:t>4</a:t>
+            </a:r>
+          </a:p>
+        </p:txBody>
+      </p:sp>
+      <p:sp>
+        <p:nvSpPr>
+          <p:cNvPr id="16" name="TextBox 15">
+            <a:extLst>
+              <a:ext uri="{FF2B5EF4-FFF2-40B4-BE49-F238E27FC236}">
+                <a16:creationId xmlns:a16="http://schemas.microsoft.com/office/drawing/2014/main" id="{5D10CE44-0C8D-4190-9407-8FFAD1829B28}"/>
+              </a:ext>
+            </a:extLst>
+          </p:cNvPr>
+          <p:cNvSpPr txBox="1"/>
+          <p:nvPr/>
+        </p:nvSpPr>
+        <p:spPr>
+          <a:xfrm>
+            <a:off x="6573953" y="4888626"/>
+            <a:ext cx="301686" cy="369332"/>
+          </a:xfrm>
+          <a:prstGeom prst="rect">
+            <a:avLst/>
+          </a:prstGeom>
+          <a:noFill/>
+        </p:spPr>
+        <p:txBody>
+          <a:bodyPr wrap="square" rtlCol="0">
+            <a:spAutoFit/>
+          </a:bodyPr>
+          <a:lstStyle/>
+          <a:p>
+            <a:r>
+              <a:rPr lang="en-US" dirty="0"/>
+              <a:t>5</a:t>
+            </a:r>
+          </a:p>
+        </p:txBody>
+      </p:sp>
+      <p:sp>
+        <p:nvSpPr>
+          <p:cNvPr id="17" name="TextBox 16">
+            <a:extLst>
+              <a:ext uri="{FF2B5EF4-FFF2-40B4-BE49-F238E27FC236}">
+                <a16:creationId xmlns:a16="http://schemas.microsoft.com/office/drawing/2014/main" id="{D7B3ADA0-5845-4D0D-B5BF-AC427EACF6BE}"/>
+              </a:ext>
+            </a:extLst>
+          </p:cNvPr>
+          <p:cNvSpPr txBox="1"/>
+          <p:nvPr/>
+        </p:nvSpPr>
+        <p:spPr>
+          <a:xfrm>
+            <a:off x="9983626" y="6553997"/>
+            <a:ext cx="301686" cy="369332"/>
+          </a:xfrm>
+          <a:prstGeom prst="rect">
+            <a:avLst/>
+          </a:prstGeom>
+          <a:noFill/>
+        </p:spPr>
+        <p:txBody>
+          <a:bodyPr wrap="none" rtlCol="0">
+            <a:spAutoFit/>
+          </a:bodyPr>
+          <a:lstStyle/>
+          <a:p>
+            <a:r>
+              <a:rPr lang="en-US" dirty="0"/>
+              <a:t>0</a:t>
+            </a:r>
+          </a:p>
+        </p:txBody>
+      </p:sp>
+      <p:sp>
+        <p:nvSpPr>
+          <p:cNvPr id="18" name="TextBox 17">
+            <a:extLst>
+              <a:ext uri="{FF2B5EF4-FFF2-40B4-BE49-F238E27FC236}">
+                <a16:creationId xmlns:a16="http://schemas.microsoft.com/office/drawing/2014/main" id="{81E7239C-6A34-4B23-BEE9-5243C247C234}"/>
+              </a:ext>
+            </a:extLst>
+          </p:cNvPr>
+          <p:cNvSpPr txBox="1"/>
+          <p:nvPr/>
+        </p:nvSpPr>
+        <p:spPr>
+          <a:xfrm>
+            <a:off x="10575305" y="5637248"/>
+            <a:ext cx="301686" cy="369332"/>
+          </a:xfrm>
+          <a:prstGeom prst="rect">
+            <a:avLst/>
+          </a:prstGeom>
+          <a:noFill/>
+        </p:spPr>
+        <p:txBody>
+          <a:bodyPr wrap="none" rtlCol="0">
+            <a:spAutoFit/>
+          </a:bodyPr>
+          <a:lstStyle/>
+          <a:p>
+            <a:r>
+              <a:rPr lang="en-US" dirty="0"/>
+              <a:t>1</a:t>
+            </a:r>
+          </a:p>
+        </p:txBody>
+      </p:sp>
+      <p:sp>
+        <p:nvSpPr>
+          <p:cNvPr id="19" name="TextBox 18">
+            <a:extLst>
+              <a:ext uri="{FF2B5EF4-FFF2-40B4-BE49-F238E27FC236}">
+                <a16:creationId xmlns:a16="http://schemas.microsoft.com/office/drawing/2014/main" id="{FB058886-F2E4-422F-8FC6-A5586341BA85}"/>
+              </a:ext>
+            </a:extLst>
+          </p:cNvPr>
+          <p:cNvSpPr txBox="1"/>
+          <p:nvPr/>
+        </p:nvSpPr>
+        <p:spPr>
+          <a:xfrm>
+            <a:off x="10596217" y="4303029"/>
+            <a:ext cx="301686" cy="369332"/>
+          </a:xfrm>
+          <a:prstGeom prst="rect">
+            <a:avLst/>
+          </a:prstGeom>
+          <a:noFill/>
+        </p:spPr>
+        <p:txBody>
+          <a:bodyPr wrap="none" rtlCol="0">
+            <a:spAutoFit/>
+          </a:bodyPr>
+          <a:lstStyle/>
+          <a:p>
+            <a:r>
+              <a:rPr lang="en-US" dirty="0"/>
+              <a:t>4</a:t>
+            </a:r>
+          </a:p>
+        </p:txBody>
+      </p:sp>
+      <p:sp>
+        <p:nvSpPr>
+          <p:cNvPr id="20" name="TextBox 19">
+            <a:extLst>
+              <a:ext uri="{FF2B5EF4-FFF2-40B4-BE49-F238E27FC236}">
+                <a16:creationId xmlns:a16="http://schemas.microsoft.com/office/drawing/2014/main" id="{CEDEB57A-8A55-48D7-836D-20AC50289BD4}"/>
+              </a:ext>
+            </a:extLst>
+          </p:cNvPr>
+          <p:cNvSpPr txBox="1"/>
+          <p:nvPr/>
+        </p:nvSpPr>
+        <p:spPr>
+          <a:xfrm>
+            <a:off x="10581269" y="2964240"/>
+            <a:ext cx="301686" cy="369332"/>
+          </a:xfrm>
+          <a:prstGeom prst="rect">
+            <a:avLst/>
+          </a:prstGeom>
+          <a:noFill/>
+        </p:spPr>
+        <p:txBody>
+          <a:bodyPr wrap="none" rtlCol="0">
+            <a:spAutoFit/>
+          </a:bodyPr>
+          <a:lstStyle/>
+          <a:p>
+            <a:r>
+              <a:rPr lang="en-US" dirty="0"/>
+              <a:t>5</a:t>
+            </a:r>
+          </a:p>
+        </p:txBody>
+      </p:sp>
+      <p:sp>
+        <p:nvSpPr>
+          <p:cNvPr id="22" name="TextBox 21">
+            <a:extLst>
+              <a:ext uri="{FF2B5EF4-FFF2-40B4-BE49-F238E27FC236}">
+                <a16:creationId xmlns:a16="http://schemas.microsoft.com/office/drawing/2014/main" id="{CF9A8637-C9B0-4B2A-8B73-7ED0C50A9087}"/>
+              </a:ext>
+            </a:extLst>
+          </p:cNvPr>
+          <p:cNvSpPr txBox="1"/>
+          <p:nvPr/>
+        </p:nvSpPr>
+        <p:spPr>
+          <a:xfrm>
+            <a:off x="3952774" y="3753360"/>
+            <a:ext cx="691536" cy="369332"/>
+          </a:xfrm>
+          <a:prstGeom prst="rect">
+            <a:avLst/>
+          </a:prstGeom>
+          <a:noFill/>
+        </p:spPr>
+        <p:txBody>
+          <a:bodyPr wrap="none" rtlCol="0">
+            <a:spAutoFit/>
+          </a:bodyPr>
+          <a:lstStyle/>
+          <a:p>
+            <a:r>
+              <a:rPr lang="en-US" dirty="0"/>
+              <a:t>face1</a:t>
+            </a:r>
+          </a:p>
+        </p:txBody>
+      </p:sp>
+      <p:sp>
+        <p:nvSpPr>
+          <p:cNvPr id="23" name="TextBox 22">
+            <a:extLst>
+              <a:ext uri="{FF2B5EF4-FFF2-40B4-BE49-F238E27FC236}">
+                <a16:creationId xmlns:a16="http://schemas.microsoft.com/office/drawing/2014/main" id="{E867A42B-8B9B-4D89-94DF-B548D107D6FF}"/>
+              </a:ext>
+            </a:extLst>
+          </p:cNvPr>
+          <p:cNvSpPr txBox="1"/>
+          <p:nvPr/>
+        </p:nvSpPr>
+        <p:spPr>
+          <a:xfrm>
+            <a:off x="8153573" y="3570534"/>
+            <a:ext cx="691536" cy="369332"/>
+          </a:xfrm>
+          <a:prstGeom prst="rect">
+            <a:avLst/>
+          </a:prstGeom>
+          <a:noFill/>
+        </p:spPr>
+        <p:txBody>
+          <a:bodyPr wrap="none" rtlCol="0">
+            <a:spAutoFit/>
+          </a:bodyPr>
+          <a:lstStyle/>
+          <a:p>
+            <a:r>
+              <a:rPr lang="en-US" dirty="0"/>
+              <a:t>face2</a:t>
+            </a:r>
+          </a:p>
+        </p:txBody>
+      </p:sp>
+      <p:sp>
+        <p:nvSpPr>
+          <p:cNvPr id="24" name="TextBox 23">
+            <a:extLst>
+              <a:ext uri="{FF2B5EF4-FFF2-40B4-BE49-F238E27FC236}">
+                <a16:creationId xmlns:a16="http://schemas.microsoft.com/office/drawing/2014/main" id="{F3D250BC-93A0-43F9-8C93-2D6DBA5F9F1E}"/>
+              </a:ext>
+            </a:extLst>
+          </p:cNvPr>
+          <p:cNvSpPr txBox="1"/>
+          <p:nvPr/>
+        </p:nvSpPr>
+        <p:spPr>
+          <a:xfrm>
+            <a:off x="7986196" y="4710886"/>
+            <a:ext cx="691536" cy="369332"/>
+          </a:xfrm>
+          <a:prstGeom prst="rect">
+            <a:avLst/>
+          </a:prstGeom>
+          <a:noFill/>
+        </p:spPr>
+        <p:txBody>
+          <a:bodyPr wrap="none" rtlCol="0">
+            <a:spAutoFit/>
+          </a:bodyPr>
+          <a:lstStyle/>
+          <a:p>
+            <a:r>
+              <a:rPr lang="en-US" dirty="0"/>
+              <a:t>face3</a:t>
+            </a:r>
+          </a:p>
+        </p:txBody>
+      </p:sp>
+      <p:sp>
+        <p:nvSpPr>
+          <p:cNvPr id="28" name="TextBox 27">
+            <a:extLst>
+              <a:ext uri="{FF2B5EF4-FFF2-40B4-BE49-F238E27FC236}">
+                <a16:creationId xmlns:a16="http://schemas.microsoft.com/office/drawing/2014/main" id="{50B1BAE2-103C-4E10-8A84-DAC91C1B3C1B}"/>
+              </a:ext>
+            </a:extLst>
+          </p:cNvPr>
+          <p:cNvSpPr txBox="1"/>
+          <p:nvPr/>
+        </p:nvSpPr>
+        <p:spPr>
+          <a:xfrm>
+            <a:off x="8048377" y="2437829"/>
+            <a:ext cx="691536" cy="369332"/>
+          </a:xfrm>
+          <a:prstGeom prst="rect">
+            <a:avLst/>
+          </a:prstGeom>
+          <a:noFill/>
+        </p:spPr>
+        <p:txBody>
+          <a:bodyPr wrap="none" rtlCol="0">
+            <a:spAutoFit/>
+          </a:bodyPr>
+          <a:lstStyle/>
+          <a:p>
+            <a:r>
+              <a:rPr lang="en-US" dirty="0"/>
+              <a:t>face4</a:t>
+            </a:r>
+          </a:p>
+        </p:txBody>
+      </p:sp>
+    </p:spTree>
+    <p:extLst>
+      <p:ext uri="{BB962C8B-B14F-4D97-AF65-F5344CB8AC3E}">
+        <p14:creationId xmlns:p14="http://schemas.microsoft.com/office/powerpoint/2010/main" val="2201964450"/>
       </p:ext>
     </p:extLst>
   </p:cSld>

</xml_diff>